<commit_message>
changed to array, not string for week10
</commit_message>
<xml_diff>
--- a/help session/week10/week10Internet.pptx
+++ b/help session/week10/week10Internet.pptx
@@ -7709,7 +7709,7 @@
         <p:spPr>
           <a:xfrm>
             <a:off x="628075" y="1289795"/>
-            <a:ext cx="12561453" cy="5942278"/>
+            <a:ext cx="12561453" cy="6719981"/>
           </a:xfrm>
         </p:spPr>
         <p:txBody>
@@ -7745,17 +7745,13 @@
           <a:p>
             <a:r>
               <a:rPr lang="en-US" dirty="0"/>
-              <a:t>Write a loop that counts the ‘number of changes’ in the string. For example</a:t>
-            </a:r>
-          </a:p>
-          <a:p>
-            <a:r>
-              <a:rPr lang="en-US" dirty="0" err="1"/>
-              <a:t>aaa</a:t>
-            </a:r>
-            <a:r>
-              <a:rPr lang="en-US" dirty="0"/>
-              <a:t> </a:t>
+              <a:t>Write a loop that counts the ‘number of changes’ in an array. For example</a:t>
+            </a:r>
+          </a:p>
+          <a:p>
+            <a:r>
+              <a:rPr lang="en-US" dirty="0"/>
+              <a:t>[a, a, a] </a:t>
             </a:r>
           </a:p>
           <a:p>
@@ -7767,12 +7763,8 @@
           </a:p>
           <a:p>
             <a:r>
-              <a:rPr lang="en-US" dirty="0" err="1"/>
-              <a:t>aab</a:t>
-            </a:r>
-            <a:r>
-              <a:rPr lang="en-US" dirty="0"/>
-              <a:t> </a:t>
+              <a:rPr lang="en-US" dirty="0"/>
+              <a:t>[a, a, b] </a:t>
             </a:r>
           </a:p>
           <a:p>
@@ -7785,7 +7777,7 @@
           <a:p>
             <a:r>
               <a:rPr lang="en-US" dirty="0"/>
-              <a:t>abba</a:t>
+              <a:t>[a, b, b, a]</a:t>
             </a:r>
           </a:p>
           <a:p>

</xml_diff>

<commit_message>
updated slide to strings
</commit_message>
<xml_diff>
--- a/help session/week10/week10Internet.pptx
+++ b/help session/week10/week10Internet.pptx
@@ -220,7 +220,7 @@
           <a:p>
             <a:fld id="{4D7E51A5-B478-1E40-8CBB-0DAA8831E99D}" type="datetimeFigureOut">
               <a:rPr lang="en-US" smtClean="0"/>
-              <a:t>10/25/20</a:t>
+              <a:t>10/26/20</a:t>
             </a:fld>
             <a:endParaRPr lang="en-US"/>
           </a:p>
@@ -385,7 +385,7 @@
           <a:p>
             <a:fld id="{D0ED587F-861E-6740-9643-E3DDAE89B8D6}" type="datetimeFigureOut">
               <a:rPr lang="en-US" smtClean="0"/>
-              <a:t>10/25/20</a:t>
+              <a:t>10/26/20</a:t>
             </a:fld>
             <a:endParaRPr lang="en-US"/>
           </a:p>
@@ -7441,9 +7441,7 @@
             <a:ext cx="12561453" cy="5068054"/>
           </a:xfrm>
           <a:ln>
-            <a:solidFill>
-              <a:schemeClr val="accent1"/>
-            </a:solidFill>
+            <a:noFill/>
           </a:ln>
         </p:spPr>
         <p:txBody>
@@ -7745,13 +7743,13 @@
           <a:p>
             <a:r>
               <a:rPr lang="en-US" dirty="0"/>
-              <a:t>Write a loop that counts the ‘number of changes’ in an array. For example</a:t>
-            </a:r>
-          </a:p>
-          <a:p>
-            <a:r>
-              <a:rPr lang="en-US" dirty="0"/>
-              <a:t>[a, a, a] </a:t>
+              <a:t>Write a loop that counts the ‘number of changes’ in a String array. For example</a:t>
+            </a:r>
+          </a:p>
+          <a:p>
+            <a:r>
+              <a:rPr lang="en-US" dirty="0"/>
+              <a:t>[“a”, “a”, “a”] </a:t>
             </a:r>
           </a:p>
           <a:p>
@@ -7764,7 +7762,7 @@
           <a:p>
             <a:r>
               <a:rPr lang="en-US" dirty="0"/>
-              <a:t>[a, a, b] </a:t>
+              <a:t>[“aa”, “aa”, “ab”] </a:t>
             </a:r>
           </a:p>
           <a:p>
@@ -7777,20 +7775,28 @@
           <a:p>
             <a:r>
               <a:rPr lang="en-US" dirty="0"/>
-              <a:t>[a, b, b, a]</a:t>
+              <a:t>[“aa”, “bb”, “</a:t>
+            </a:r>
+            <a:r>
+              <a:rPr lang="en-US" dirty="0" err="1"/>
+              <a:t>ba</a:t>
+            </a:r>
+            <a:r>
+              <a:rPr lang="en-US" dirty="0"/>
+              <a:t>”, “aa”]</a:t>
             </a:r>
           </a:p>
           <a:p>
             <a:pPr lvl="1"/>
             <a:r>
               <a:rPr lang="en-US" dirty="0"/>
-              <a:t>2 changes</a:t>
-            </a:r>
-          </a:p>
-          <a:p>
-            <a:r>
-              <a:rPr lang="en-US" dirty="0"/>
-              <a:t>To do this you must look at the ‘previous’ or last character! </a:t>
+              <a:t>3 changes</a:t>
+            </a:r>
+          </a:p>
+          <a:p>
+            <a:r>
+              <a:rPr lang="en-US" dirty="0"/>
+              <a:t>To do this you must look at the ‘previous’ or last String! </a:t>
             </a:r>
           </a:p>
           <a:p>

</xml_diff>